<commit_message>
Our poster stuff, and a new Timeline
A powerpoint of our poster, plus pictures for it. Plus an updated
timeline, and the old ones were deleted.
</commit_message>
<xml_diff>
--- a/Documentation/Poster Design.pptx
+++ b/Documentation/Poster Design.pptx
@@ -6,6 +6,7 @@
   </p:sldMasterIdLst>
   <p:sldIdLst>
     <p:sldId id="256" r:id="rId3"/>
+    <p:sldId id="257" r:id="rId4"/>
   </p:sldIdLst>
   <p:sldSz cx="6858000" cy="9144000"/>
   <p:notesSz cx="7772400" cy="10058400"/>
@@ -1202,7 +1203,7 @@
         <p:spPr>
           <a:xfrm>
             <a:off x="0" y="0"/>
-            <a:ext cx="6857280" cy="9138240"/>
+            <a:ext cx="6855840" cy="9136800"/>
           </a:xfrm>
           <a:prstGeom prst="rect">
             <a:avLst/>
@@ -1412,7 +1413,7 @@
         <p:spPr>
           <a:xfrm>
             <a:off x="514440" y="3860640"/>
-            <a:ext cx="5827680" cy="1957680"/>
+            <a:ext cx="5826240" cy="1956240"/>
           </a:xfrm>
           <a:prstGeom prst="rect">
             <a:avLst/>
@@ -1431,8 +1432,8 @@
         </p:nvSpPr>
         <p:spPr>
           <a:xfrm>
-            <a:off x="1944000" y="257040"/>
-            <a:ext cx="3084840" cy="931320"/>
+            <a:off x="1121760" y="1828800"/>
+            <a:ext cx="4546440" cy="929880"/>
           </a:xfrm>
           <a:prstGeom prst="rect">
             <a:avLst/>
@@ -1464,41 +1465,16 @@
           </a:p>
         </p:txBody>
       </p:sp>
-      <p:pic>
-        <p:nvPicPr>
-          <p:cNvPr id="39" name="" descr=""/>
-          <p:cNvPicPr/>
-          <p:nvPr/>
-        </p:nvPicPr>
-        <p:blipFill>
-          <a:blip r:embed="rId1"/>
-          <a:stretch>
-            <a:fillRect/>
-          </a:stretch>
-        </p:blipFill>
-        <p:spPr>
-          <a:xfrm>
-            <a:off x="640080" y="4053960"/>
-            <a:ext cx="5577840" cy="3900960"/>
-          </a:xfrm>
-          <a:prstGeom prst="rect">
-            <a:avLst/>
-          </a:prstGeom>
-          <a:ln>
-            <a:noFill/>
-          </a:ln>
-        </p:spPr>
-      </p:pic>
-      <p:sp>
-        <p:nvSpPr>
-          <p:cNvPr id="40" name="CustomShape 3"/>
+      <p:sp>
+        <p:nvSpPr>
+          <p:cNvPr id="39" name="CustomShape 3"/>
           <p:cNvSpPr/>
           <p:nvPr/>
         </p:nvSpPr>
         <p:spPr>
           <a:xfrm>
             <a:off x="198720" y="182880"/>
-            <a:ext cx="1904040" cy="1113840"/>
+            <a:ext cx="1902600" cy="1112400"/>
           </a:xfrm>
           <a:prstGeom prst="rect">
             <a:avLst/>
@@ -1556,14 +1532,14 @@
       </p:sp>
       <p:sp>
         <p:nvSpPr>
-          <p:cNvPr id="41" name="CustomShape 4"/>
+          <p:cNvPr id="40" name="CustomShape 4"/>
           <p:cNvSpPr/>
           <p:nvPr/>
         </p:nvSpPr>
         <p:spPr>
           <a:xfrm>
-            <a:off x="1188720" y="2011680"/>
-            <a:ext cx="4388760" cy="931320"/>
+            <a:off x="1188720" y="2249640"/>
+            <a:ext cx="4387320" cy="929880"/>
           </a:xfrm>
           <a:prstGeom prst="rect">
             <a:avLst/>
@@ -1597,14 +1573,14 @@
       </p:sp>
       <p:sp>
         <p:nvSpPr>
-          <p:cNvPr id="42" name="CustomShape 5"/>
+          <p:cNvPr id="41" name="CustomShape 5"/>
           <p:cNvSpPr/>
           <p:nvPr/>
         </p:nvSpPr>
         <p:spPr>
           <a:xfrm>
             <a:off x="822960" y="2817360"/>
-            <a:ext cx="5486400" cy="931320"/>
+            <a:ext cx="5484960" cy="929880"/>
           </a:xfrm>
           <a:prstGeom prst="rect">
             <a:avLst/>
@@ -1638,6 +1614,31 @@
       </p:sp>
       <p:pic>
         <p:nvPicPr>
+          <p:cNvPr id="42" name="" descr=""/>
+          <p:cNvPicPr/>
+          <p:nvPr/>
+        </p:nvPicPr>
+        <p:blipFill>
+          <a:blip r:embed="rId1"/>
+          <a:stretch>
+            <a:fillRect/>
+          </a:stretch>
+        </p:blipFill>
+        <p:spPr>
+          <a:xfrm>
+            <a:off x="2651760" y="160200"/>
+            <a:ext cx="1583640" cy="1667520"/>
+          </a:xfrm>
+          <a:prstGeom prst="rect">
+            <a:avLst/>
+          </a:prstGeom>
+          <a:ln>
+            <a:noFill/>
+          </a:ln>
+        </p:spPr>
+      </p:pic>
+      <p:pic>
+        <p:nvPicPr>
           <p:cNvPr id="43" name="" descr=""/>
           <p:cNvPicPr/>
           <p:nvPr/>
@@ -1650,8 +1651,108 @@
         </p:blipFill>
         <p:spPr>
           <a:xfrm>
-            <a:off x="1836720" y="8138160"/>
-            <a:ext cx="3466440" cy="914040"/>
+            <a:off x="0" y="7589520"/>
+            <a:ext cx="547920" cy="1554120"/>
+          </a:xfrm>
+          <a:prstGeom prst="rect">
+            <a:avLst/>
+          </a:prstGeom>
+          <a:ln>
+            <a:noFill/>
+          </a:ln>
+        </p:spPr>
+      </p:pic>
+      <p:pic>
+        <p:nvPicPr>
+          <p:cNvPr id="44" name="" descr=""/>
+          <p:cNvPicPr/>
+          <p:nvPr/>
+        </p:nvPicPr>
+        <p:blipFill>
+          <a:blip r:embed="rId3"/>
+          <a:stretch>
+            <a:fillRect/>
+          </a:stretch>
+        </p:blipFill>
+        <p:spPr>
+          <a:xfrm>
+            <a:off x="548640" y="8046720"/>
+            <a:ext cx="365040" cy="1096920"/>
+          </a:xfrm>
+          <a:prstGeom prst="rect">
+            <a:avLst/>
+          </a:prstGeom>
+          <a:ln>
+            <a:noFill/>
+          </a:ln>
+        </p:spPr>
+      </p:pic>
+      <p:pic>
+        <p:nvPicPr>
+          <p:cNvPr id="45" name="" descr=""/>
+          <p:cNvPicPr/>
+          <p:nvPr/>
+        </p:nvPicPr>
+        <p:blipFill>
+          <a:blip r:embed="rId4"/>
+          <a:stretch>
+            <a:fillRect/>
+          </a:stretch>
+        </p:blipFill>
+        <p:spPr>
+          <a:xfrm>
+            <a:off x="2621520" y="160200"/>
+            <a:ext cx="1584720" cy="1667520"/>
+          </a:xfrm>
+          <a:prstGeom prst="rect">
+            <a:avLst/>
+          </a:prstGeom>
+          <a:ln>
+            <a:noFill/>
+          </a:ln>
+        </p:spPr>
+      </p:pic>
+      <p:pic>
+        <p:nvPicPr>
+          <p:cNvPr id="46" name="" descr=""/>
+          <p:cNvPicPr/>
+          <p:nvPr/>
+        </p:nvPicPr>
+        <p:blipFill>
+          <a:blip r:embed="rId5"/>
+          <a:stretch>
+            <a:fillRect/>
+          </a:stretch>
+        </p:blipFill>
+        <p:spPr>
+          <a:xfrm>
+            <a:off x="1463040" y="8348400"/>
+            <a:ext cx="3192480" cy="765360"/>
+          </a:xfrm>
+          <a:prstGeom prst="rect">
+            <a:avLst/>
+          </a:prstGeom>
+          <a:ln>
+            <a:noFill/>
+          </a:ln>
+        </p:spPr>
+      </p:pic>
+      <p:pic>
+        <p:nvPicPr>
+          <p:cNvPr id="47" name="" descr=""/>
+          <p:cNvPicPr/>
+          <p:nvPr/>
+        </p:nvPicPr>
+        <p:blipFill>
+          <a:blip r:embed="rId6"/>
+          <a:stretch>
+            <a:fillRect/>
+          </a:stretch>
+        </p:blipFill>
+        <p:spPr>
+          <a:xfrm>
+            <a:off x="4655520" y="8348400"/>
+            <a:ext cx="922320" cy="771120"/>
           </a:xfrm>
           <a:prstGeom prst="rect">
             <a:avLst/>
@@ -1670,6 +1771,347 @@
           <p:childTnLst>
             <p:seq>
               <p:cTn id="2" nodeType="mainSeq"/>
+              <p:prevCondLst>
+                <p:cond delay="0" evt="onPrev">
+                  <p:tgtEl>
+                    <p:sldTgt/>
+                  </p:tgtEl>
+                </p:cond>
+              </p:prevCondLst>
+              <p:nextCondLst>
+                <p:cond delay="0" evt="onNext">
+                  <p:tgtEl>
+                    <p:sldTgt/>
+                  </p:tgtEl>
+                </p:cond>
+              </p:nextCondLst>
+            </p:seq>
+          </p:childTnLst>
+        </p:cTn>
+      </p:par>
+    </p:tnLst>
+  </p:timing>
+</p:sld>
+</file>
+
+<file path=ppt/slides/slide2.xml><?xml version="1.0" encoding="utf-8"?>
+<p:sld xmlns:a="http://schemas.openxmlformats.org/drawingml/2006/main" xmlns:p="http://schemas.openxmlformats.org/presentationml/2006/main" xmlns:r="http://schemas.openxmlformats.org/officeDocument/2006/relationships">
+  <p:cSld>
+    <p:spTree>
+      <p:nvGrpSpPr>
+        <p:cNvPr id="1" name=""/>
+        <p:cNvGrpSpPr/>
+        <p:nvPr/>
+      </p:nvGrpSpPr>
+      <p:grpSpPr>
+        <a:xfrm>
+          <a:off x="0" y="0"/>
+          <a:ext cx="0" cy="0"/>
+          <a:chOff x="0" y="0"/>
+          <a:chExt cx="0" cy="0"/>
+        </a:xfrm>
+      </p:grpSpPr>
+      <p:sp>
+        <p:nvSpPr>
+          <p:cNvPr id="48" name="CustomShape 1"/>
+          <p:cNvSpPr/>
+          <p:nvPr/>
+        </p:nvSpPr>
+        <p:spPr>
+          <a:xfrm>
+            <a:off x="731520" y="2340720"/>
+            <a:ext cx="5826240" cy="1956240"/>
+          </a:xfrm>
+          <a:prstGeom prst="rect">
+            <a:avLst/>
+          </a:prstGeom>
+          <a:noFill/>
+          <a:ln>
+            <a:noFill/>
+          </a:ln>
+        </p:spPr>
+      </p:sp>
+      <p:sp>
+        <p:nvSpPr>
+          <p:cNvPr id="49" name="CustomShape 2"/>
+          <p:cNvSpPr/>
+          <p:nvPr/>
+        </p:nvSpPr>
+        <p:spPr>
+          <a:xfrm>
+            <a:off x="1338840" y="308880"/>
+            <a:ext cx="4546440" cy="929880"/>
+          </a:xfrm>
+          <a:prstGeom prst="rect">
+            <a:avLst/>
+          </a:prstGeom>
+          <a:noFill/>
+          <a:ln>
+            <a:noFill/>
+          </a:ln>
+        </p:spPr>
+        <p:txBody>
+          <a:bodyPr lIns="90000" rIns="90000" tIns="45000" bIns="45000"/>
+          <a:p>
+            <a:pPr algn="ctr">
+              <a:lnSpc>
+                <a:spcPct val="100000"/>
+              </a:lnSpc>
+            </a:pPr>
+            <a:r>
+              <a:rPr lang="en-US" sz="4000">
+                <a:solidFill>
+                  <a:srgbClr val="2323dc"/>
+                </a:solidFill>
+                <a:latin typeface="Corbel"/>
+                <a:ea typeface="DejaVu Sans"/>
+              </a:rPr>
+              <a:t>Team PLUVALI</a:t>
+            </a:r>
+            <a:endParaRPr/>
+          </a:p>
+        </p:txBody>
+      </p:sp>
+      <p:sp>
+        <p:nvSpPr>
+          <p:cNvPr id="50" name="CustomShape 3"/>
+          <p:cNvSpPr/>
+          <p:nvPr/>
+        </p:nvSpPr>
+        <p:spPr>
+          <a:xfrm>
+            <a:off x="457200" y="217440"/>
+            <a:ext cx="1902600" cy="1112400"/>
+          </a:xfrm>
+          <a:prstGeom prst="rect">
+            <a:avLst/>
+          </a:prstGeom>
+          <a:noFill/>
+          <a:ln>
+            <a:noFill/>
+          </a:ln>
+        </p:spPr>
+        <p:txBody>
+          <a:bodyPr lIns="90000" rIns="90000" tIns="45000" bIns="45000"/>
+          <a:p>
+            <a:r>
+              <a:rPr lang="en-US" sz="1200">
+                <a:latin typeface="Arial"/>
+              </a:rPr>
+              <a:t> </a:t>
+            </a:r>
+            <a:r>
+              <a:rPr lang="en-US" sz="1200">
+                <a:latin typeface="Arial"/>
+              </a:rPr>
+              <a:t>Alexander Davis</a:t>
+            </a:r>
+            <a:endParaRPr/>
+          </a:p>
+          <a:p>
+            <a:r>
+              <a:rPr lang="en-US" sz="1200">
+                <a:latin typeface="Arial"/>
+              </a:rPr>
+              <a:t>Steven Kosovich</a:t>
+            </a:r>
+            <a:endParaRPr/>
+          </a:p>
+          <a:p>
+            <a:r>
+              <a:rPr lang="en-US" sz="1200">
+                <a:latin typeface="Arial"/>
+              </a:rPr>
+              <a:t>Timothy Leikam</a:t>
+            </a:r>
+            <a:endParaRPr/>
+          </a:p>
+          <a:p>
+            <a:r>
+              <a:rPr lang="en-US" sz="1200">
+                <a:latin typeface="Arial"/>
+              </a:rPr>
+              <a:t>Gregory Martini</a:t>
+            </a:r>
+            <a:endParaRPr/>
+          </a:p>
+        </p:txBody>
+      </p:sp>
+      <p:sp>
+        <p:nvSpPr>
+          <p:cNvPr id="51" name="CustomShape 4"/>
+          <p:cNvSpPr/>
+          <p:nvPr/>
+        </p:nvSpPr>
+        <p:spPr>
+          <a:xfrm>
+            <a:off x="1405800" y="840960"/>
+            <a:ext cx="4387320" cy="929880"/>
+          </a:xfrm>
+          <a:prstGeom prst="rect">
+            <a:avLst/>
+          </a:prstGeom>
+          <a:noFill/>
+          <a:ln>
+            <a:noFill/>
+          </a:ln>
+        </p:spPr>
+        <p:txBody>
+          <a:bodyPr lIns="90000" rIns="90000" tIns="45000" bIns="45000"/>
+          <a:p>
+            <a:pPr algn="ctr">
+              <a:lnSpc>
+                <a:spcPct val="100000"/>
+              </a:lnSpc>
+            </a:pPr>
+            <a:r>
+              <a:rPr lang="en-US" sz="4000">
+                <a:solidFill>
+                  <a:srgbClr val="dc2300"/>
+                </a:solidFill>
+                <a:latin typeface="Corbel"/>
+                <a:ea typeface="DejaVu Sans"/>
+              </a:rPr>
+              <a:t>Coping Skills Game</a:t>
+            </a:r>
+            <a:endParaRPr/>
+          </a:p>
+        </p:txBody>
+      </p:sp>
+      <p:pic>
+        <p:nvPicPr>
+          <p:cNvPr id="52" name="" descr=""/>
+          <p:cNvPicPr/>
+          <p:nvPr/>
+        </p:nvPicPr>
+        <p:blipFill>
+          <a:blip r:embed="rId1"/>
+          <a:stretch>
+            <a:fillRect/>
+          </a:stretch>
+        </p:blipFill>
+        <p:spPr>
+          <a:xfrm>
+            <a:off x="914400" y="6352920"/>
+            <a:ext cx="5303520" cy="2744640"/>
+          </a:xfrm>
+          <a:prstGeom prst="rect">
+            <a:avLst/>
+          </a:prstGeom>
+          <a:ln>
+            <a:noFill/>
+          </a:ln>
+        </p:spPr>
+      </p:pic>
+      <p:pic>
+        <p:nvPicPr>
+          <p:cNvPr id="53" name="" descr=""/>
+          <p:cNvPicPr/>
+          <p:nvPr/>
+        </p:nvPicPr>
+        <p:blipFill>
+          <a:blip r:embed="rId2"/>
+          <a:stretch>
+            <a:fillRect/>
+          </a:stretch>
+        </p:blipFill>
+        <p:spPr>
+          <a:xfrm>
+            <a:off x="1188720" y="1828800"/>
+            <a:ext cx="4571640" cy="4571640"/>
+          </a:xfrm>
+          <a:prstGeom prst="rect">
+            <a:avLst/>
+          </a:prstGeom>
+          <a:ln>
+            <a:noFill/>
+          </a:ln>
+        </p:spPr>
+      </p:pic>
+      <p:pic>
+        <p:nvPicPr>
+          <p:cNvPr id="54" name="" descr=""/>
+          <p:cNvPicPr/>
+          <p:nvPr/>
+        </p:nvPicPr>
+        <p:blipFill>
+          <a:blip r:embed="rId3"/>
+          <a:stretch>
+            <a:fillRect/>
+          </a:stretch>
+        </p:blipFill>
+        <p:spPr>
+          <a:xfrm>
+            <a:off x="1280160" y="1920240"/>
+            <a:ext cx="4373640" cy="4374360"/>
+          </a:xfrm>
+          <a:prstGeom prst="rect">
+            <a:avLst/>
+          </a:prstGeom>
+          <a:ln>
+            <a:noFill/>
+          </a:ln>
+        </p:spPr>
+      </p:pic>
+      <p:pic>
+        <p:nvPicPr>
+          <p:cNvPr id="55" name="" descr=""/>
+          <p:cNvPicPr/>
+          <p:nvPr/>
+        </p:nvPicPr>
+        <p:blipFill>
+          <a:blip r:embed="rId4"/>
+          <a:stretch>
+            <a:fillRect/>
+          </a:stretch>
+        </p:blipFill>
+        <p:spPr>
+          <a:xfrm>
+            <a:off x="0" y="6056280"/>
+            <a:ext cx="913680" cy="3087000"/>
+          </a:xfrm>
+          <a:prstGeom prst="rect">
+            <a:avLst/>
+          </a:prstGeom>
+          <a:ln>
+            <a:noFill/>
+          </a:ln>
+        </p:spPr>
+      </p:pic>
+      <p:pic>
+        <p:nvPicPr>
+          <p:cNvPr id="56" name="" descr=""/>
+          <p:cNvPicPr/>
+          <p:nvPr/>
+        </p:nvPicPr>
+        <p:blipFill>
+          <a:blip r:embed="rId5"/>
+          <a:stretch>
+            <a:fillRect/>
+          </a:stretch>
+        </p:blipFill>
+        <p:spPr>
+          <a:xfrm>
+            <a:off x="1005840" y="6400800"/>
+            <a:ext cx="5119920" cy="2696760"/>
+          </a:xfrm>
+          <a:prstGeom prst="rect">
+            <a:avLst/>
+          </a:prstGeom>
+          <a:ln>
+            <a:noFill/>
+          </a:ln>
+        </p:spPr>
+      </p:pic>
+    </p:spTree>
+  </p:cSld>
+  <p:timing>
+    <p:tnLst>
+      <p:par>
+        <p:cTn id="3" dur="indefinite" restart="never" nodeType="tmRoot">
+          <p:childTnLst>
+            <p:seq>
+              <p:cTn id="4" nodeType="mainSeq"/>
               <p:prevCondLst>
                 <p:cond delay="0" evt="onPrev">
                   <p:tgtEl>

</xml_diff>

<commit_message>
The Finished Poster for the first semester
A PowerPoint of our poster, plus some images that are in it.
</commit_message>
<xml_diff>
--- a/Documentation/Poster Design.pptx
+++ b/Documentation/Poster Design.pptx
@@ -1203,7 +1203,7 @@
         <p:spPr>
           <a:xfrm>
             <a:off x="0" y="0"/>
-            <a:ext cx="6855840" cy="9136800"/>
+            <a:ext cx="6855120" cy="9136080"/>
           </a:xfrm>
           <a:prstGeom prst="rect">
             <a:avLst/>
@@ -1413,7 +1413,7 @@
         <p:spPr>
           <a:xfrm>
             <a:off x="514440" y="3860640"/>
-            <a:ext cx="5826240" cy="1956240"/>
+            <a:ext cx="5825520" cy="1955520"/>
           </a:xfrm>
           <a:prstGeom prst="rect">
             <a:avLst/>
@@ -1433,7 +1433,7 @@
         <p:spPr>
           <a:xfrm>
             <a:off x="1121760" y="1828800"/>
-            <a:ext cx="4546440" cy="929880"/>
+            <a:ext cx="4545720" cy="929160"/>
           </a:xfrm>
           <a:prstGeom prst="rect">
             <a:avLst/>
@@ -1474,7 +1474,7 @@
         <p:spPr>
           <a:xfrm>
             <a:off x="198720" y="182880"/>
-            <a:ext cx="1902600" cy="1112400"/>
+            <a:ext cx="1901880" cy="1111680"/>
           </a:xfrm>
           <a:prstGeom prst="rect">
             <a:avLst/>
@@ -1539,7 +1539,7 @@
         <p:spPr>
           <a:xfrm>
             <a:off x="1188720" y="2249640"/>
-            <a:ext cx="4387320" cy="929880"/>
+            <a:ext cx="4386600" cy="929160"/>
           </a:xfrm>
           <a:prstGeom prst="rect">
             <a:avLst/>
@@ -1580,7 +1580,7 @@
         <p:spPr>
           <a:xfrm>
             <a:off x="822960" y="2817360"/>
-            <a:ext cx="5484960" cy="929880"/>
+            <a:ext cx="5484240" cy="929160"/>
           </a:xfrm>
           <a:prstGeom prst="rect">
             <a:avLst/>
@@ -1627,7 +1627,7 @@
         <p:spPr>
           <a:xfrm>
             <a:off x="2651760" y="160200"/>
-            <a:ext cx="1583640" cy="1667520"/>
+            <a:ext cx="1582920" cy="1666800"/>
           </a:xfrm>
           <a:prstGeom prst="rect">
             <a:avLst/>
@@ -1652,7 +1652,7 @@
         <p:spPr>
           <a:xfrm>
             <a:off x="0" y="7589520"/>
-            <a:ext cx="547920" cy="1554120"/>
+            <a:ext cx="547200" cy="1553400"/>
           </a:xfrm>
           <a:prstGeom prst="rect">
             <a:avLst/>
@@ -1677,7 +1677,7 @@
         <p:spPr>
           <a:xfrm>
             <a:off x="548640" y="8046720"/>
-            <a:ext cx="365040" cy="1096920"/>
+            <a:ext cx="364320" cy="1096200"/>
           </a:xfrm>
           <a:prstGeom prst="rect">
             <a:avLst/>
@@ -1701,8 +1701,8 @@
         </p:blipFill>
         <p:spPr>
           <a:xfrm>
-            <a:off x="2621520" y="160200"/>
-            <a:ext cx="1584720" cy="1667520"/>
+            <a:off x="2621520" y="182880"/>
+            <a:ext cx="1584000" cy="1644120"/>
           </a:xfrm>
           <a:prstGeom prst="rect">
             <a:avLst/>
@@ -1727,7 +1727,7 @@
         <p:spPr>
           <a:xfrm>
             <a:off x="1463040" y="8348400"/>
-            <a:ext cx="3192480" cy="765360"/>
+            <a:ext cx="3191760" cy="764640"/>
           </a:xfrm>
           <a:prstGeom prst="rect">
             <a:avLst/>
@@ -1752,7 +1752,32 @@
         <p:spPr>
           <a:xfrm>
             <a:off x="4655520" y="8348400"/>
-            <a:ext cx="922320" cy="771120"/>
+            <a:ext cx="921600" cy="770400"/>
+          </a:xfrm>
+          <a:prstGeom prst="rect">
+            <a:avLst/>
+          </a:prstGeom>
+          <a:ln>
+            <a:noFill/>
+          </a:ln>
+        </p:spPr>
+      </p:pic>
+      <p:pic>
+        <p:nvPicPr>
+          <p:cNvPr id="48" name="" descr=""/>
+          <p:cNvPicPr/>
+          <p:nvPr/>
+        </p:nvPicPr>
+        <p:blipFill>
+          <a:blip r:embed="rId7"/>
+          <a:stretch>
+            <a:fillRect/>
+          </a:stretch>
+        </p:blipFill>
+        <p:spPr>
+          <a:xfrm>
+            <a:off x="0" y="3985920"/>
+            <a:ext cx="6857640" cy="4243680"/>
           </a:xfrm>
           <a:prstGeom prst="rect">
             <a:avLst/>
@@ -1813,14 +1838,14 @@
       </p:grpSpPr>
       <p:sp>
         <p:nvSpPr>
-          <p:cNvPr id="48" name="CustomShape 1"/>
+          <p:cNvPr id="49" name="CustomShape 1"/>
           <p:cNvSpPr/>
           <p:nvPr/>
         </p:nvSpPr>
         <p:spPr>
           <a:xfrm>
             <a:off x="731520" y="2340720"/>
-            <a:ext cx="5826240" cy="1956240"/>
+            <a:ext cx="5825520" cy="1955520"/>
           </a:xfrm>
           <a:prstGeom prst="rect">
             <a:avLst/>
@@ -1833,14 +1858,14 @@
       </p:sp>
       <p:sp>
         <p:nvSpPr>
-          <p:cNvPr id="49" name="CustomShape 2"/>
+          <p:cNvPr id="50" name="CustomShape 2"/>
           <p:cNvSpPr/>
           <p:nvPr/>
         </p:nvSpPr>
         <p:spPr>
           <a:xfrm>
-            <a:off x="1338840" y="308880"/>
-            <a:ext cx="4546440" cy="929880"/>
+            <a:off x="1280160" y="822960"/>
+            <a:ext cx="4545720" cy="929160"/>
           </a:xfrm>
           <a:prstGeom prst="rect">
             <a:avLst/>
@@ -1859,7 +1884,7 @@
               </a:lnSpc>
             </a:pPr>
             <a:r>
-              <a:rPr lang="en-US" sz="4000">
+              <a:rPr lang="en-US" sz="2400">
                 <a:solidFill>
                   <a:srgbClr val="2323dc"/>
                 </a:solidFill>
@@ -1874,14 +1899,14 @@
       </p:sp>
       <p:sp>
         <p:nvSpPr>
-          <p:cNvPr id="50" name="CustomShape 3"/>
+          <p:cNvPr id="51" name="CustomShape 3"/>
           <p:cNvSpPr/>
           <p:nvPr/>
         </p:nvSpPr>
         <p:spPr>
           <a:xfrm>
-            <a:off x="457200" y="217440"/>
-            <a:ext cx="1902600" cy="1112400"/>
+            <a:off x="292680" y="182880"/>
+            <a:ext cx="1901880" cy="1111680"/>
           </a:xfrm>
           <a:prstGeom prst="rect">
             <a:avLst/>
@@ -1939,14 +1964,14 @@
       </p:sp>
       <p:sp>
         <p:nvSpPr>
-          <p:cNvPr id="51" name="CustomShape 4"/>
+          <p:cNvPr id="52" name="CustomShape 4"/>
           <p:cNvSpPr/>
           <p:nvPr/>
         </p:nvSpPr>
         <p:spPr>
           <a:xfrm>
-            <a:off x="1405800" y="840960"/>
-            <a:ext cx="4387320" cy="929880"/>
+            <a:off x="1374120" y="1082520"/>
+            <a:ext cx="4386600" cy="929160"/>
           </a:xfrm>
           <a:prstGeom prst="rect">
             <a:avLst/>
@@ -1980,7 +2005,7 @@
       </p:sp>
       <p:pic>
         <p:nvPicPr>
-          <p:cNvPr id="52" name="" descr=""/>
+          <p:cNvPr id="53" name="" descr=""/>
           <p:cNvPicPr/>
           <p:nvPr/>
         </p:nvPicPr>
@@ -1992,8 +2017,8 @@
         </p:blipFill>
         <p:spPr>
           <a:xfrm>
-            <a:off x="914400" y="6352920"/>
-            <a:ext cx="5303520" cy="2744640"/>
+            <a:off x="0" y="6056280"/>
+            <a:ext cx="912960" cy="3086280"/>
           </a:xfrm>
           <a:prstGeom prst="rect">
             <a:avLst/>
@@ -2005,7 +2030,7 @@
       </p:pic>
       <p:pic>
         <p:nvPicPr>
-          <p:cNvPr id="53" name="" descr=""/>
+          <p:cNvPr id="54" name="" descr=""/>
           <p:cNvPicPr/>
           <p:nvPr/>
         </p:nvPicPr>
@@ -2017,8 +2042,8 @@
         </p:blipFill>
         <p:spPr>
           <a:xfrm>
-            <a:off x="1188720" y="1828800"/>
-            <a:ext cx="4571640" cy="4571640"/>
+            <a:off x="1188720" y="6400800"/>
+            <a:ext cx="4572000" cy="2651760"/>
           </a:xfrm>
           <a:prstGeom prst="rect">
             <a:avLst/>
@@ -2030,7 +2055,7 @@
       </p:pic>
       <p:pic>
         <p:nvPicPr>
-          <p:cNvPr id="54" name="" descr=""/>
+          <p:cNvPr id="55" name="" descr=""/>
           <p:cNvPicPr/>
           <p:nvPr/>
         </p:nvPicPr>
@@ -2042,8 +2067,8 @@
         </p:blipFill>
         <p:spPr>
           <a:xfrm>
-            <a:off x="1280160" y="1920240"/>
-            <a:ext cx="4373640" cy="4374360"/>
+            <a:off x="1371600" y="6447960"/>
+            <a:ext cx="4207680" cy="2513160"/>
           </a:xfrm>
           <a:prstGeom prst="rect">
             <a:avLst/>
@@ -2055,7 +2080,7 @@
       </p:pic>
       <p:pic>
         <p:nvPicPr>
-          <p:cNvPr id="55" name="" descr=""/>
+          <p:cNvPr id="56" name="" descr=""/>
           <p:cNvPicPr/>
           <p:nvPr/>
         </p:nvPicPr>
@@ -2067,8 +2092,8 @@
         </p:blipFill>
         <p:spPr>
           <a:xfrm>
-            <a:off x="0" y="6056280"/>
-            <a:ext cx="913680" cy="3087000"/>
+            <a:off x="1554480" y="182880"/>
+            <a:ext cx="3840480" cy="731520"/>
           </a:xfrm>
           <a:prstGeom prst="rect">
             <a:avLst/>
@@ -2080,7 +2105,7 @@
       </p:pic>
       <p:pic>
         <p:nvPicPr>
-          <p:cNvPr id="56" name="" descr=""/>
+          <p:cNvPr id="57" name="" descr=""/>
           <p:cNvPicPr/>
           <p:nvPr/>
         </p:nvPicPr>
@@ -2092,8 +2117,58 @@
         </p:blipFill>
         <p:spPr>
           <a:xfrm>
-            <a:off x="1005840" y="6400800"/>
-            <a:ext cx="5119920" cy="2696760"/>
+            <a:off x="1648080" y="274320"/>
+            <a:ext cx="3655440" cy="548640"/>
+          </a:xfrm>
+          <a:prstGeom prst="rect">
+            <a:avLst/>
+          </a:prstGeom>
+          <a:ln>
+            <a:noFill/>
+          </a:ln>
+        </p:spPr>
+      </p:pic>
+      <p:pic>
+        <p:nvPicPr>
+          <p:cNvPr id="58" name="" descr=""/>
+          <p:cNvPicPr/>
+          <p:nvPr/>
+        </p:nvPicPr>
+        <p:blipFill>
+          <a:blip r:embed="rId6"/>
+          <a:stretch>
+            <a:fillRect/>
+          </a:stretch>
+        </p:blipFill>
+        <p:spPr>
+          <a:xfrm>
+            <a:off x="1188720" y="1920240"/>
+            <a:ext cx="4572000" cy="4389120"/>
+          </a:xfrm>
+          <a:prstGeom prst="rect">
+            <a:avLst/>
+          </a:prstGeom>
+          <a:ln>
+            <a:noFill/>
+          </a:ln>
+        </p:spPr>
+      </p:pic>
+      <p:pic>
+        <p:nvPicPr>
+          <p:cNvPr id="59" name="" descr=""/>
+          <p:cNvPicPr/>
+          <p:nvPr/>
+        </p:nvPicPr>
+        <p:blipFill>
+          <a:blip r:embed="rId7"/>
+          <a:stretch>
+            <a:fillRect/>
+          </a:stretch>
+        </p:blipFill>
+        <p:spPr>
+          <a:xfrm>
+            <a:off x="1280160" y="2011680"/>
+            <a:ext cx="4372920" cy="4206240"/>
           </a:xfrm>
           <a:prstGeom prst="rect">
             <a:avLst/>

</xml_diff>